<commit_message>
Some final paper commits
</commit_message>
<xml_diff>
--- a/presentations/Updates 11-16-20.pptx
+++ b/presentations/Updates 11-16-20.pptx
@@ -4540,7 +4540,7 @@
           <a:p>
             <a:fld id="{8FB244FF-1FFB-514F-A5D9-580791D347E8}" type="datetimeFigureOut">
               <a:rPr lang="en-US" smtClean="0"/>
-              <a:t>11/16/20</a:t>
+              <a:t>12/29/20</a:t>
             </a:fld>
             <a:endParaRPr lang="en-US"/>
           </a:p>
@@ -5917,7 +5917,7 @@
           <a:p>
             <a:fld id="{8C0AA0B7-332D-774C-A1C2-95B9048EE1A4}" type="datetimeFigureOut">
               <a:rPr lang="en-US" smtClean="0"/>
-              <a:t>11/16/20</a:t>
+              <a:t>12/29/20</a:t>
             </a:fld>
             <a:endParaRPr lang="en-US"/>
           </a:p>
@@ -6115,7 +6115,7 @@
           <a:p>
             <a:fld id="{8C0AA0B7-332D-774C-A1C2-95B9048EE1A4}" type="datetimeFigureOut">
               <a:rPr lang="en-US" smtClean="0"/>
-              <a:t>11/16/20</a:t>
+              <a:t>12/29/20</a:t>
             </a:fld>
             <a:endParaRPr lang="en-US"/>
           </a:p>
@@ -6323,7 +6323,7 @@
           <a:p>
             <a:fld id="{8C0AA0B7-332D-774C-A1C2-95B9048EE1A4}" type="datetimeFigureOut">
               <a:rPr lang="en-US" smtClean="0"/>
-              <a:t>11/16/20</a:t>
+              <a:t>12/29/20</a:t>
             </a:fld>
             <a:endParaRPr lang="en-US"/>
           </a:p>
@@ -6521,7 +6521,7 @@
           <a:p>
             <a:fld id="{8C0AA0B7-332D-774C-A1C2-95B9048EE1A4}" type="datetimeFigureOut">
               <a:rPr lang="en-US" smtClean="0"/>
-              <a:t>11/16/20</a:t>
+              <a:t>12/29/20</a:t>
             </a:fld>
             <a:endParaRPr lang="en-US"/>
           </a:p>
@@ -6796,7 +6796,7 @@
           <a:p>
             <a:fld id="{8C0AA0B7-332D-774C-A1C2-95B9048EE1A4}" type="datetimeFigureOut">
               <a:rPr lang="en-US" smtClean="0"/>
-              <a:t>11/16/20</a:t>
+              <a:t>12/29/20</a:t>
             </a:fld>
             <a:endParaRPr lang="en-US"/>
           </a:p>
@@ -7061,7 +7061,7 @@
           <a:p>
             <a:fld id="{8C0AA0B7-332D-774C-A1C2-95B9048EE1A4}" type="datetimeFigureOut">
               <a:rPr lang="en-US" smtClean="0"/>
-              <a:t>11/16/20</a:t>
+              <a:t>12/29/20</a:t>
             </a:fld>
             <a:endParaRPr lang="en-US"/>
           </a:p>
@@ -7473,7 +7473,7 @@
           <a:p>
             <a:fld id="{8C0AA0B7-332D-774C-A1C2-95B9048EE1A4}" type="datetimeFigureOut">
               <a:rPr lang="en-US" smtClean="0"/>
-              <a:t>11/16/20</a:t>
+              <a:t>12/29/20</a:t>
             </a:fld>
             <a:endParaRPr lang="en-US"/>
           </a:p>
@@ -7614,7 +7614,7 @@
           <a:p>
             <a:fld id="{8C0AA0B7-332D-774C-A1C2-95B9048EE1A4}" type="datetimeFigureOut">
               <a:rPr lang="en-US" smtClean="0"/>
-              <a:t>11/16/20</a:t>
+              <a:t>12/29/20</a:t>
             </a:fld>
             <a:endParaRPr lang="en-US"/>
           </a:p>
@@ -7727,7 +7727,7 @@
           <a:p>
             <a:fld id="{8C0AA0B7-332D-774C-A1C2-95B9048EE1A4}" type="datetimeFigureOut">
               <a:rPr lang="en-US" smtClean="0"/>
-              <a:t>11/16/20</a:t>
+              <a:t>12/29/20</a:t>
             </a:fld>
             <a:endParaRPr lang="en-US"/>
           </a:p>
@@ -8038,7 +8038,7 @@
           <a:p>
             <a:fld id="{8C0AA0B7-332D-774C-A1C2-95B9048EE1A4}" type="datetimeFigureOut">
               <a:rPr lang="en-US" smtClean="0"/>
-              <a:t>11/16/20</a:t>
+              <a:t>12/29/20</a:t>
             </a:fld>
             <a:endParaRPr lang="en-US"/>
           </a:p>
@@ -8326,7 +8326,7 @@
           <a:p>
             <a:fld id="{8C0AA0B7-332D-774C-A1C2-95B9048EE1A4}" type="datetimeFigureOut">
               <a:rPr lang="en-US" smtClean="0"/>
-              <a:t>11/16/20</a:t>
+              <a:t>12/29/20</a:t>
             </a:fld>
             <a:endParaRPr lang="en-US"/>
           </a:p>
@@ -8567,7 +8567,7 @@
           <a:p>
             <a:fld id="{8C0AA0B7-332D-774C-A1C2-95B9048EE1A4}" type="datetimeFigureOut">
               <a:rPr lang="en-US" smtClean="0"/>
-              <a:t>11/16/20</a:t>
+              <a:t>12/29/20</a:t>
             </a:fld>
             <a:endParaRPr lang="en-US"/>
           </a:p>
@@ -36277,10 +36277,10 @@
         </p:nvGrpSpPr>
         <p:grpSpPr>
           <a:xfrm>
-            <a:off x="3685974" y="-1747950"/>
-            <a:ext cx="5955577" cy="9630408"/>
-            <a:chOff x="3685974" y="-1747950"/>
-            <a:chExt cx="5955577" cy="9630408"/>
+            <a:off x="3685974" y="-1747951"/>
+            <a:ext cx="5955577" cy="8921328"/>
+            <a:chOff x="3685974" y="-1747951"/>
+            <a:chExt cx="5955577" cy="8921328"/>
           </a:xfrm>
         </p:grpSpPr>
         <p:pic>
@@ -36304,8 +36304,8 @@
           </p:blipFill>
           <p:spPr>
             <a:xfrm>
-              <a:off x="3703607" y="-1747950"/>
-              <a:ext cx="5937944" cy="4467871"/>
+              <a:off x="3703607" y="-1747951"/>
+              <a:ext cx="5937944" cy="4467870"/>
             </a:xfrm>
             <a:prstGeom prst="rect">
               <a:avLst/>
@@ -36333,7 +36333,7 @@
           </p:blipFill>
           <p:spPr>
             <a:xfrm>
-              <a:off x="3703607" y="3429000"/>
+              <a:off x="3685974" y="2719919"/>
               <a:ext cx="5937944" cy="4453458"/>
             </a:xfrm>
             <a:prstGeom prst="rect">
@@ -36355,7 +36355,7 @@
           </p:nvSpPr>
           <p:spPr>
             <a:xfrm>
-              <a:off x="3703607" y="255152"/>
+              <a:off x="3957843" y="255152"/>
               <a:ext cx="526106" cy="461665"/>
             </a:xfrm>
             <a:prstGeom prst="rect">
@@ -36393,7 +36393,7 @@
           </p:nvSpPr>
           <p:spPr>
             <a:xfrm>
-              <a:off x="3685974" y="5424896"/>
+              <a:off x="3957843" y="4715815"/>
               <a:ext cx="543739" cy="461665"/>
             </a:xfrm>
             <a:prstGeom prst="rect">
@@ -36418,6 +36418,114 @@
           </p:txBody>
         </p:sp>
       </p:grpSp>
+      <p:sp>
+        <p:nvSpPr>
+          <p:cNvPr id="2" name="TextBox 1">
+            <a:extLst>
+              <a:ext uri="{FF2B5EF4-FFF2-40B4-BE49-F238E27FC236}">
+                <a16:creationId xmlns:a16="http://schemas.microsoft.com/office/drawing/2014/main" id="{7CAD886E-F1E4-0E43-A40F-AF7337A394D1}"/>
+              </a:ext>
+            </a:extLst>
+          </p:cNvPr>
+          <p:cNvSpPr txBox="1"/>
+          <p:nvPr/>
+        </p:nvSpPr>
+        <p:spPr>
+          <a:xfrm>
+            <a:off x="4497977" y="-1572177"/>
+            <a:ext cx="4349204" cy="461665"/>
+          </a:xfrm>
+          <a:prstGeom prst="rect">
+            <a:avLst/>
+          </a:prstGeom>
+          <a:noFill/>
+        </p:spPr>
+        <p:txBody>
+          <a:bodyPr wrap="none" rtlCol="0">
+            <a:spAutoFit/>
+          </a:bodyPr>
+          <a:lstStyle/>
+          <a:p>
+            <a:pPr algn="ctr"/>
+            <a:r>
+              <a:rPr lang="en-US" sz="2400" dirty="0">
+                <a:latin typeface="Times" pitchFamily="2" charset="0"/>
+              </a:rPr>
+              <a:t>VBL Start/Step Parameter Tuning</a:t>
+            </a:r>
+          </a:p>
+        </p:txBody>
+      </p:sp>
+      <p:sp>
+        <p:nvSpPr>
+          <p:cNvPr id="9" name="TextBox 8">
+            <a:extLst>
+              <a:ext uri="{FF2B5EF4-FFF2-40B4-BE49-F238E27FC236}">
+                <a16:creationId xmlns:a16="http://schemas.microsoft.com/office/drawing/2014/main" id="{330403E4-3569-9C41-A7C4-C17BF46F5F98}"/>
+              </a:ext>
+            </a:extLst>
+          </p:cNvPr>
+          <p:cNvSpPr txBox="1"/>
+          <p:nvPr/>
+        </p:nvSpPr>
+        <p:spPr>
+          <a:xfrm>
+            <a:off x="4497977" y="2895693"/>
+            <a:ext cx="4349204" cy="461665"/>
+          </a:xfrm>
+          <a:prstGeom prst="rect">
+            <a:avLst/>
+          </a:prstGeom>
+          <a:noFill/>
+        </p:spPr>
+        <p:txBody>
+          <a:bodyPr wrap="none" rtlCol="0">
+            <a:spAutoFit/>
+          </a:bodyPr>
+          <a:lstStyle/>
+          <a:p>
+            <a:pPr algn="ctr"/>
+            <a:r>
+              <a:rPr lang="en-US" sz="2400" dirty="0">
+                <a:latin typeface="Times" pitchFamily="2" charset="0"/>
+              </a:rPr>
+              <a:t>VSL Start/Step Parameter Tuning</a:t>
+            </a:r>
+          </a:p>
+        </p:txBody>
+      </p:sp>
+      <p:sp>
+        <p:nvSpPr>
+          <p:cNvPr id="3" name="TextBox 2">
+            <a:extLst>
+              <a:ext uri="{FF2B5EF4-FFF2-40B4-BE49-F238E27FC236}">
+                <a16:creationId xmlns:a16="http://schemas.microsoft.com/office/drawing/2014/main" id="{D85B7AF3-92FB-2747-AFC3-30FF5F871D76}"/>
+              </a:ext>
+            </a:extLst>
+          </p:cNvPr>
+          <p:cNvSpPr txBox="1"/>
+          <p:nvPr/>
+        </p:nvSpPr>
+        <p:spPr>
+          <a:xfrm>
+            <a:off x="11450782" y="8416636"/>
+            <a:ext cx="184731" cy="369332"/>
+          </a:xfrm>
+          <a:prstGeom prst="rect">
+            <a:avLst/>
+          </a:prstGeom>
+          <a:noFill/>
+        </p:spPr>
+        <p:txBody>
+          <a:bodyPr wrap="none" rtlCol="0">
+            <a:spAutoFit/>
+          </a:bodyPr>
+          <a:lstStyle/>
+          <a:p>
+            <a:endParaRPr lang="en-US" dirty="0"/>
+          </a:p>
+        </p:txBody>
+      </p:sp>
     </p:spTree>
     <p:extLst>
       <p:ext uri="{BB962C8B-B14F-4D97-AF65-F5344CB8AC3E}">
@@ -36880,7 +36988,7 @@
         <p:spPr>
           <a:xfrm>
             <a:off x="3757613" y="2035930"/>
-            <a:ext cx="5237181" cy="3930726"/>
+            <a:ext cx="5237181" cy="3930725"/>
           </a:xfrm>
         </p:spPr>
       </p:pic>
@@ -36923,14 +37031,13 @@
           </p:cNvPr>
           <p:cNvCxnSpPr>
             <a:cxnSpLocks/>
-            <a:stCxn id="12" idx="2"/>
           </p:cNvCxnSpPr>
           <p:nvPr/>
         </p:nvCxnSpPr>
         <p:spPr>
           <a:xfrm flipH="1">
-            <a:off x="5413972" y="3492894"/>
-            <a:ext cx="373579" cy="1676635"/>
+            <a:off x="5438274" y="3682916"/>
+            <a:ext cx="657726" cy="1322221"/>
           </a:xfrm>
           <a:prstGeom prst="straightConnector1">
             <a:avLst/>
@@ -36971,8 +37078,8 @@
         </p:nvSpPr>
         <p:spPr>
           <a:xfrm>
-            <a:off x="4893644" y="2846563"/>
-            <a:ext cx="1787813" cy="646331"/>
+            <a:off x="6096000" y="3105835"/>
+            <a:ext cx="1580147" cy="577081"/>
           </a:xfrm>
           <a:prstGeom prst="rect">
             <a:avLst/>
@@ -36990,7 +37097,7 @@
           <a:lstStyle/>
           <a:p>
             <a:r>
-              <a:rPr lang="en-US" sz="1200" b="1" dirty="0">
+              <a:rPr lang="en-US" sz="1050" b="1" dirty="0">
                 <a:solidFill>
                   <a:srgbClr val="FF0000"/>
                 </a:solidFill>
@@ -37002,7 +37109,7 @@
           </a:p>
           <a:p>
             <a:r>
-              <a:rPr lang="en-US" sz="1200" dirty="0">
+              <a:rPr lang="en-US" sz="1050" dirty="0">
                 <a:solidFill>
                   <a:srgbClr val="FF0000"/>
                 </a:solidFill>
@@ -37014,7 +37121,7 @@
           </a:p>
           <a:p>
             <a:r>
-              <a:rPr lang="en-US" sz="1200" dirty="0">
+              <a:rPr lang="en-US" sz="1050" dirty="0">
                 <a:solidFill>
                   <a:srgbClr val="FF0000"/>
                 </a:solidFill>
@@ -37023,6 +37130,60 @@
               </a:rPr>
               <a:t>Start Voltage: 0V</a:t>
             </a:r>
+          </a:p>
+        </p:txBody>
+      </p:sp>
+      <p:sp>
+        <p:nvSpPr>
+          <p:cNvPr id="10" name="5-Point Star 9">
+            <a:extLst>
+              <a:ext uri="{FF2B5EF4-FFF2-40B4-BE49-F238E27FC236}">
+                <a16:creationId xmlns:a16="http://schemas.microsoft.com/office/drawing/2014/main" id="{CE44B234-BC8F-0442-A66E-ECDF470D31E4}"/>
+              </a:ext>
+            </a:extLst>
+          </p:cNvPr>
+          <p:cNvSpPr/>
+          <p:nvPr/>
+        </p:nvSpPr>
+        <p:spPr>
+          <a:xfrm>
+            <a:off x="5319255" y="4886118"/>
+            <a:ext cx="238038" cy="238038"/>
+          </a:xfrm>
+          <a:prstGeom prst="star5">
+            <a:avLst/>
+          </a:prstGeom>
+          <a:solidFill>
+            <a:srgbClr val="FFFF00"/>
+          </a:solidFill>
+          <a:ln>
+            <a:solidFill>
+              <a:schemeClr val="tx1"/>
+            </a:solidFill>
+          </a:ln>
+        </p:spPr>
+        <p:style>
+          <a:lnRef idx="2">
+            <a:schemeClr val="accent1">
+              <a:shade val="50000"/>
+            </a:schemeClr>
+          </a:lnRef>
+          <a:fillRef idx="1">
+            <a:schemeClr val="accent1"/>
+          </a:fillRef>
+          <a:effectRef idx="0">
+            <a:schemeClr val="accent1"/>
+          </a:effectRef>
+          <a:fontRef idx="minor">
+            <a:schemeClr val="lt1"/>
+          </a:fontRef>
+        </p:style>
+        <p:txBody>
+          <a:bodyPr rtlCol="0" anchor="ctr"/>
+          <a:lstStyle/>
+          <a:p>
+            <a:pPr algn="ctr"/>
+            <a:endParaRPr lang="en-US"/>
           </a:p>
         </p:txBody>
       </p:sp>
@@ -37195,7 +37356,7 @@
         <p:spPr>
           <a:xfrm>
             <a:off x="3197204" y="1825625"/>
-            <a:ext cx="5797590" cy="4351337"/>
+            <a:ext cx="5797590" cy="4351336"/>
           </a:xfrm>
         </p:spPr>
       </p:pic>
@@ -37210,14 +37371,13 @@
           </p:cNvPr>
           <p:cNvCxnSpPr>
             <a:cxnSpLocks/>
-            <a:stCxn id="7" idx="2"/>
           </p:cNvCxnSpPr>
           <p:nvPr/>
         </p:nvCxnSpPr>
         <p:spPr>
           <a:xfrm flipH="1">
-            <a:off x="5033380" y="3262333"/>
-            <a:ext cx="1694072" cy="2061105"/>
+            <a:off x="5017168" y="3597442"/>
+            <a:ext cx="1356020" cy="1515979"/>
           </a:xfrm>
           <a:prstGeom prst="straightConnector1">
             <a:avLst/>
@@ -37258,8 +37418,8 @@
         </p:nvSpPr>
         <p:spPr>
           <a:xfrm>
-            <a:off x="5795671" y="2616002"/>
-            <a:ext cx="1863561" cy="646331"/>
+            <a:off x="6373188" y="3001012"/>
+            <a:ext cx="1555624" cy="596430"/>
           </a:xfrm>
           <a:prstGeom prst="rect">
             <a:avLst/>
@@ -37277,7 +37437,7 @@
           <a:lstStyle/>
           <a:p>
             <a:r>
-              <a:rPr lang="en-US" sz="1200" b="1" dirty="0">
+              <a:rPr lang="en-US" sz="1050" b="1" dirty="0">
                 <a:solidFill>
                   <a:srgbClr val="FF0000"/>
                 </a:solidFill>
@@ -37289,7 +37449,7 @@
           </a:p>
           <a:p>
             <a:r>
-              <a:rPr lang="en-US" sz="1200" dirty="0">
+              <a:rPr lang="en-US" sz="1050" dirty="0">
                 <a:solidFill>
                   <a:srgbClr val="FF0000"/>
                 </a:solidFill>
@@ -37301,7 +37461,7 @@
           </a:p>
           <a:p>
             <a:r>
-              <a:rPr lang="en-US" sz="1200" dirty="0">
+              <a:rPr lang="en-US" sz="1050" dirty="0">
                 <a:solidFill>
                   <a:srgbClr val="FF0000"/>
                 </a:solidFill>
@@ -37310,6 +37470,60 @@
               </a:rPr>
               <a:t>Start Voltage: 0V</a:t>
             </a:r>
+          </a:p>
+        </p:txBody>
+      </p:sp>
+      <p:sp>
+        <p:nvSpPr>
+          <p:cNvPr id="9" name="5-Point Star 8">
+            <a:extLst>
+              <a:ext uri="{FF2B5EF4-FFF2-40B4-BE49-F238E27FC236}">
+                <a16:creationId xmlns:a16="http://schemas.microsoft.com/office/drawing/2014/main" id="{6346CF1E-0343-A54B-9B53-831B33B7CEA4}"/>
+              </a:ext>
+            </a:extLst>
+          </p:cNvPr>
+          <p:cNvSpPr/>
+          <p:nvPr/>
+        </p:nvSpPr>
+        <p:spPr>
+          <a:xfrm>
+            <a:off x="4898149" y="5010320"/>
+            <a:ext cx="238038" cy="238038"/>
+          </a:xfrm>
+          <a:prstGeom prst="star5">
+            <a:avLst/>
+          </a:prstGeom>
+          <a:solidFill>
+            <a:srgbClr val="FFFF00"/>
+          </a:solidFill>
+          <a:ln>
+            <a:solidFill>
+              <a:schemeClr val="tx1"/>
+            </a:solidFill>
+          </a:ln>
+        </p:spPr>
+        <p:style>
+          <a:lnRef idx="2">
+            <a:schemeClr val="accent1">
+              <a:shade val="50000"/>
+            </a:schemeClr>
+          </a:lnRef>
+          <a:fillRef idx="1">
+            <a:schemeClr val="accent1"/>
+          </a:fillRef>
+          <a:effectRef idx="0">
+            <a:schemeClr val="accent1"/>
+          </a:effectRef>
+          <a:fontRef idx="minor">
+            <a:schemeClr val="lt1"/>
+          </a:fontRef>
+        </p:style>
+        <p:txBody>
+          <a:bodyPr rtlCol="0" anchor="ctr"/>
+          <a:lstStyle/>
+          <a:p>
+            <a:pPr algn="ctr"/>
+            <a:endParaRPr lang="en-US"/>
           </a:p>
         </p:txBody>
       </p:sp>

</xml_diff>